<commit_message>
Fixing IETwo.sce to shoot out portcodes for visual catch trials
</commit_message>
<xml_diff>
--- a/IEInitial/plots/Pilot/Pilot Data.pptx
+++ b/IEInitial/plots/Pilot/Pilot Data.pptx
@@ -246,7 +246,7 @@
           <a:p>
             <a:fld id="{08F289A4-CCED-483A-A82B-83DE375823DD}" type="datetimeFigureOut">
               <a:rPr lang="en-US" smtClean="0"/>
-              <a:t>8/31/2018</a:t>
+              <a:t>9/10/2018</a:t>
             </a:fld>
             <a:endParaRPr lang="en-US"/>
           </a:p>
@@ -416,7 +416,7 @@
           <a:p>
             <a:fld id="{08F289A4-CCED-483A-A82B-83DE375823DD}" type="datetimeFigureOut">
               <a:rPr lang="en-US" smtClean="0"/>
-              <a:t>8/31/2018</a:t>
+              <a:t>9/10/2018</a:t>
             </a:fld>
             <a:endParaRPr lang="en-US"/>
           </a:p>
@@ -596,7 +596,7 @@
           <a:p>
             <a:fld id="{08F289A4-CCED-483A-A82B-83DE375823DD}" type="datetimeFigureOut">
               <a:rPr lang="en-US" smtClean="0"/>
-              <a:t>8/31/2018</a:t>
+              <a:t>9/10/2018</a:t>
             </a:fld>
             <a:endParaRPr lang="en-US"/>
           </a:p>
@@ -766,7 +766,7 @@
           <a:p>
             <a:fld id="{08F289A4-CCED-483A-A82B-83DE375823DD}" type="datetimeFigureOut">
               <a:rPr lang="en-US" smtClean="0"/>
-              <a:t>8/31/2018</a:t>
+              <a:t>9/10/2018</a:t>
             </a:fld>
             <a:endParaRPr lang="en-US"/>
           </a:p>
@@ -1012,7 +1012,7 @@
           <a:p>
             <a:fld id="{08F289A4-CCED-483A-A82B-83DE375823DD}" type="datetimeFigureOut">
               <a:rPr lang="en-US" smtClean="0"/>
-              <a:t>8/31/2018</a:t>
+              <a:t>9/10/2018</a:t>
             </a:fld>
             <a:endParaRPr lang="en-US"/>
           </a:p>
@@ -1244,7 +1244,7 @@
           <a:p>
             <a:fld id="{08F289A4-CCED-483A-A82B-83DE375823DD}" type="datetimeFigureOut">
               <a:rPr lang="en-US" smtClean="0"/>
-              <a:t>8/31/2018</a:t>
+              <a:t>9/10/2018</a:t>
             </a:fld>
             <a:endParaRPr lang="en-US"/>
           </a:p>
@@ -1611,7 +1611,7 @@
           <a:p>
             <a:fld id="{08F289A4-CCED-483A-A82B-83DE375823DD}" type="datetimeFigureOut">
               <a:rPr lang="en-US" smtClean="0"/>
-              <a:t>8/31/2018</a:t>
+              <a:t>9/10/2018</a:t>
             </a:fld>
             <a:endParaRPr lang="en-US"/>
           </a:p>
@@ -1729,7 +1729,7 @@
           <a:p>
             <a:fld id="{08F289A4-CCED-483A-A82B-83DE375823DD}" type="datetimeFigureOut">
               <a:rPr lang="en-US" smtClean="0"/>
-              <a:t>8/31/2018</a:t>
+              <a:t>9/10/2018</a:t>
             </a:fld>
             <a:endParaRPr lang="en-US"/>
           </a:p>
@@ -1824,7 +1824,7 @@
           <a:p>
             <a:fld id="{08F289A4-CCED-483A-A82B-83DE375823DD}" type="datetimeFigureOut">
               <a:rPr lang="en-US" smtClean="0"/>
-              <a:t>8/31/2018</a:t>
+              <a:t>9/10/2018</a:t>
             </a:fld>
             <a:endParaRPr lang="en-US"/>
           </a:p>
@@ -2101,7 +2101,7 @@
           <a:p>
             <a:fld id="{08F289A4-CCED-483A-A82B-83DE375823DD}" type="datetimeFigureOut">
               <a:rPr lang="en-US" smtClean="0"/>
-              <a:t>8/31/2018</a:t>
+              <a:t>9/10/2018</a:t>
             </a:fld>
             <a:endParaRPr lang="en-US"/>
           </a:p>
@@ -2354,7 +2354,7 @@
           <a:p>
             <a:fld id="{08F289A4-CCED-483A-A82B-83DE375823DD}" type="datetimeFigureOut">
               <a:rPr lang="en-US" smtClean="0"/>
-              <a:t>8/31/2018</a:t>
+              <a:t>9/10/2018</a:t>
             </a:fld>
             <a:endParaRPr lang="en-US"/>
           </a:p>
@@ -2567,7 +2567,7 @@
           <a:p>
             <a:fld id="{08F289A4-CCED-483A-A82B-83DE375823DD}" type="datetimeFigureOut">
               <a:rPr lang="en-US" smtClean="0"/>
-              <a:t>8/31/2018</a:t>
+              <a:t>9/10/2018</a:t>
             </a:fld>
             <a:endParaRPr lang="en-US"/>
           </a:p>

</xml_diff>